<commit_message>
added Large File handing methods in FastAPI
</commit_message>
<xml_diff>
--- a/Slides/Day-4/FASTAPI Development using Python on Cloud-Day4.pptx
+++ b/Slides/Day-4/FASTAPI Development using Python on Cloud-Day4.pptx
@@ -931,7 +931,7 @@
           <a:p>
             <a:fld id="{FD1C4689-B28D-4D3C-8B05-9ABB967E2A3E}" type="datetime1">
               <a:rPr lang="en-US" smtClean="0"/>
-              <a:t>2/11/2026</a:t>
+              <a:t>2/20/2026</a:t>
             </a:fld>
             <a:endParaRPr lang="en-US" dirty="0"/>
           </a:p>
@@ -1188,7 +1188,7 @@
           <a:p>
             <a:fld id="{FD1C4689-B28D-4D3C-8B05-9ABB967E2A3E}" type="datetime1">
               <a:rPr lang="en-US" smtClean="0"/>
-              <a:t>2/11/2026</a:t>
+              <a:t>2/20/2026</a:t>
             </a:fld>
             <a:endParaRPr lang="en-US" dirty="0"/>
           </a:p>
@@ -1508,7 +1508,7 @@
           <a:p>
             <a:fld id="{FD1C4689-B28D-4D3C-8B05-9ABB967E2A3E}" type="datetime1">
               <a:rPr lang="en-US" smtClean="0"/>
-              <a:t>2/11/2026</a:t>
+              <a:t>2/20/2026</a:t>
             </a:fld>
             <a:endParaRPr lang="en-US" dirty="0"/>
           </a:p>
@@ -1847,7 +1847,7 @@
           <a:p>
             <a:fld id="{FD1C4689-B28D-4D3C-8B05-9ABB967E2A3E}" type="datetime1">
               <a:rPr lang="en-US" smtClean="0"/>
-              <a:t>2/11/2026</a:t>
+              <a:t>2/20/2026</a:t>
             </a:fld>
             <a:endParaRPr lang="en-US" dirty="0"/>
           </a:p>
@@ -2167,7 +2167,7 @@
           <a:p>
             <a:fld id="{FD1C4689-B28D-4D3C-8B05-9ABB967E2A3E}" type="datetime1">
               <a:rPr lang="en-US" smtClean="0"/>
-              <a:t>2/11/2026</a:t>
+              <a:t>2/20/2026</a:t>
             </a:fld>
             <a:endParaRPr lang="en-US" dirty="0"/>
           </a:p>
@@ -2566,7 +2566,7 @@
           <a:p>
             <a:fld id="{FD1C4689-B28D-4D3C-8B05-9ABB967E2A3E}" type="datetime1">
               <a:rPr lang="en-US" smtClean="0"/>
-              <a:t>2/11/2026</a:t>
+              <a:t>2/20/2026</a:t>
             </a:fld>
             <a:endParaRPr lang="en-US" dirty="0"/>
           </a:p>
@@ -2742,7 +2742,7 @@
           <a:p>
             <a:fld id="{FD1C4689-B28D-4D3C-8B05-9ABB967E2A3E}" type="datetime1">
               <a:rPr lang="en-US" smtClean="0"/>
-              <a:t>2/11/2026</a:t>
+              <a:t>2/20/2026</a:t>
             </a:fld>
             <a:endParaRPr lang="en-US" dirty="0"/>
           </a:p>
@@ -2928,7 +2928,7 @@
           <a:p>
             <a:fld id="{FD1C4689-B28D-4D3C-8B05-9ABB967E2A3E}" type="datetime1">
               <a:rPr lang="en-US" smtClean="0"/>
-              <a:t>2/11/2026</a:t>
+              <a:t>2/20/2026</a:t>
             </a:fld>
             <a:endParaRPr lang="en-US" dirty="0"/>
           </a:p>
@@ -3104,7 +3104,7 @@
           <a:p>
             <a:fld id="{FD1C4689-B28D-4D3C-8B05-9ABB967E2A3E}" type="datetime1">
               <a:rPr lang="en-US" smtClean="0"/>
-              <a:t>2/11/2026</a:t>
+              <a:t>2/20/2026</a:t>
             </a:fld>
             <a:endParaRPr lang="en-US" dirty="0"/>
           </a:p>
@@ -3357,7 +3357,7 @@
           <a:p>
             <a:fld id="{FD1C4689-B28D-4D3C-8B05-9ABB967E2A3E}" type="datetime1">
               <a:rPr lang="en-US" smtClean="0"/>
-              <a:t>2/11/2026</a:t>
+              <a:t>2/20/2026</a:t>
             </a:fld>
             <a:endParaRPr lang="en-US" dirty="0"/>
           </a:p>
@@ -3595,7 +3595,7 @@
           <a:p>
             <a:fld id="{FD1C4689-B28D-4D3C-8B05-9ABB967E2A3E}" type="datetime1">
               <a:rPr lang="en-US" smtClean="0"/>
-              <a:t>2/11/2026</a:t>
+              <a:t>2/20/2026</a:t>
             </a:fld>
             <a:endParaRPr lang="en-US" dirty="0"/>
           </a:p>
@@ -3975,7 +3975,7 @@
           <a:p>
             <a:fld id="{FD1C4689-B28D-4D3C-8B05-9ABB967E2A3E}" type="datetime1">
               <a:rPr lang="en-US" smtClean="0"/>
-              <a:t>2/11/2026</a:t>
+              <a:t>2/20/2026</a:t>
             </a:fld>
             <a:endParaRPr lang="en-US" dirty="0"/>
           </a:p>
@@ -4104,7 +4104,7 @@
           <a:p>
             <a:fld id="{7C72CE4D-D83F-44D4-ACB0-A88A6B9DB4F7}" type="datetime1">
               <a:rPr lang="en-US" smtClean="0"/>
-              <a:t>2/11/2026</a:t>
+              <a:t>2/20/2026</a:t>
             </a:fld>
             <a:endParaRPr lang="en-US"/>
           </a:p>
@@ -4202,7 +4202,7 @@
           <a:p>
             <a:fld id="{9A62F981-1EE1-49F5-B605-4EA23F0307AC}" type="datetime1">
               <a:rPr lang="en-US" smtClean="0"/>
-              <a:t>2/11/2026</a:t>
+              <a:t>2/20/2026</a:t>
             </a:fld>
             <a:endParaRPr lang="en-US"/>
           </a:p>
@@ -4460,7 +4460,7 @@
           <a:p>
             <a:fld id="{B0B6493B-A447-4205-AC2D-AE2DEDAE4E3B}" type="datetime1">
               <a:rPr lang="en-US" smtClean="0"/>
-              <a:t>2/11/2026</a:t>
+              <a:t>2/20/2026</a:t>
             </a:fld>
             <a:endParaRPr lang="en-US"/>
           </a:p>
@@ -4773,7 +4773,7 @@
           <a:p>
             <a:fld id="{FD1C4689-B28D-4D3C-8B05-9ABB967E2A3E}" type="datetime1">
               <a:rPr lang="en-US" smtClean="0"/>
-              <a:t>2/11/2026</a:t>
+              <a:t>2/20/2026</a:t>
             </a:fld>
             <a:endParaRPr lang="en-US" dirty="0"/>
           </a:p>
@@ -5532,7 +5532,7 @@
           <a:p>
             <a:fld id="{FD1C4689-B28D-4D3C-8B05-9ABB967E2A3E}" type="datetime1">
               <a:rPr lang="en-US" smtClean="0"/>
-              <a:t>2/11/2026</a:t>
+              <a:t>2/20/2026</a:t>
             </a:fld>
             <a:endParaRPr lang="en-US" dirty="0"/>
           </a:p>

</xml_diff>